<commit_message>
Versão do artigo antes da revisão do inglês.
</commit_message>
<xml_diff>
--- a/eye-tracker/RSL/V2/Fig05.pptx
+++ b/eye-tracker/RSL/V2/Fig05.pptx
@@ -259,7 +259,7 @@
           <a:p>
             <a:fld id="{C0B191C1-8D2E-4FD4-AED9-2704AB6C3203}" type="datetimeFigureOut">
               <a:rPr lang="pt-BR" smtClean="0"/>
-              <a:t>05/04/2020</a:t>
+              <a:t>19/04/2020</a:t>
             </a:fld>
             <a:endParaRPr lang="pt-BR"/>
           </a:p>
@@ -457,7 +457,7 @@
           <a:p>
             <a:fld id="{C0B191C1-8D2E-4FD4-AED9-2704AB6C3203}" type="datetimeFigureOut">
               <a:rPr lang="pt-BR" smtClean="0"/>
-              <a:t>05/04/2020</a:t>
+              <a:t>19/04/2020</a:t>
             </a:fld>
             <a:endParaRPr lang="pt-BR"/>
           </a:p>
@@ -665,7 +665,7 @@
           <a:p>
             <a:fld id="{C0B191C1-8D2E-4FD4-AED9-2704AB6C3203}" type="datetimeFigureOut">
               <a:rPr lang="pt-BR" smtClean="0"/>
-              <a:t>05/04/2020</a:t>
+              <a:t>19/04/2020</a:t>
             </a:fld>
             <a:endParaRPr lang="pt-BR"/>
           </a:p>
@@ -863,7 +863,7 @@
           <a:p>
             <a:fld id="{C0B191C1-8D2E-4FD4-AED9-2704AB6C3203}" type="datetimeFigureOut">
               <a:rPr lang="pt-BR" smtClean="0"/>
-              <a:t>05/04/2020</a:t>
+              <a:t>19/04/2020</a:t>
             </a:fld>
             <a:endParaRPr lang="pt-BR"/>
           </a:p>
@@ -1138,7 +1138,7 @@
           <a:p>
             <a:fld id="{C0B191C1-8D2E-4FD4-AED9-2704AB6C3203}" type="datetimeFigureOut">
               <a:rPr lang="pt-BR" smtClean="0"/>
-              <a:t>05/04/2020</a:t>
+              <a:t>19/04/2020</a:t>
             </a:fld>
             <a:endParaRPr lang="pt-BR"/>
           </a:p>
@@ -1403,7 +1403,7 @@
           <a:p>
             <a:fld id="{C0B191C1-8D2E-4FD4-AED9-2704AB6C3203}" type="datetimeFigureOut">
               <a:rPr lang="pt-BR" smtClean="0"/>
-              <a:t>05/04/2020</a:t>
+              <a:t>19/04/2020</a:t>
             </a:fld>
             <a:endParaRPr lang="pt-BR"/>
           </a:p>
@@ -1815,7 +1815,7 @@
           <a:p>
             <a:fld id="{C0B191C1-8D2E-4FD4-AED9-2704AB6C3203}" type="datetimeFigureOut">
               <a:rPr lang="pt-BR" smtClean="0"/>
-              <a:t>05/04/2020</a:t>
+              <a:t>19/04/2020</a:t>
             </a:fld>
             <a:endParaRPr lang="pt-BR"/>
           </a:p>
@@ -1956,7 +1956,7 @@
           <a:p>
             <a:fld id="{C0B191C1-8D2E-4FD4-AED9-2704AB6C3203}" type="datetimeFigureOut">
               <a:rPr lang="pt-BR" smtClean="0"/>
-              <a:t>05/04/2020</a:t>
+              <a:t>19/04/2020</a:t>
             </a:fld>
             <a:endParaRPr lang="pt-BR"/>
           </a:p>
@@ -2069,7 +2069,7 @@
           <a:p>
             <a:fld id="{C0B191C1-8D2E-4FD4-AED9-2704AB6C3203}" type="datetimeFigureOut">
               <a:rPr lang="pt-BR" smtClean="0"/>
-              <a:t>05/04/2020</a:t>
+              <a:t>19/04/2020</a:t>
             </a:fld>
             <a:endParaRPr lang="pt-BR"/>
           </a:p>
@@ -2380,7 +2380,7 @@
           <a:p>
             <a:fld id="{C0B191C1-8D2E-4FD4-AED9-2704AB6C3203}" type="datetimeFigureOut">
               <a:rPr lang="pt-BR" smtClean="0"/>
-              <a:t>05/04/2020</a:t>
+              <a:t>19/04/2020</a:t>
             </a:fld>
             <a:endParaRPr lang="pt-BR"/>
           </a:p>
@@ -2668,7 +2668,7 @@
           <a:p>
             <a:fld id="{C0B191C1-8D2E-4FD4-AED9-2704AB6C3203}" type="datetimeFigureOut">
               <a:rPr lang="pt-BR" smtClean="0"/>
-              <a:t>05/04/2020</a:t>
+              <a:t>19/04/2020</a:t>
             </a:fld>
             <a:endParaRPr lang="pt-BR"/>
           </a:p>
@@ -2909,7 +2909,7 @@
           <a:p>
             <a:fld id="{C0B191C1-8D2E-4FD4-AED9-2704AB6C3203}" type="datetimeFigureOut">
               <a:rPr lang="pt-BR" smtClean="0"/>
-              <a:t>05/04/2020</a:t>
+              <a:t>19/04/2020</a:t>
             </a:fld>
             <a:endParaRPr lang="pt-BR"/>
           </a:p>
@@ -4599,7 +4599,7 @@
             <a:pPr algn="ctr"/>
             <a:r>
               <a:rPr lang="en-US" sz="1400" dirty="0"/>
-              <a:t>5</a:t>
+              <a:t>2</a:t>
             </a:r>
           </a:p>
           <a:p>
@@ -4642,7 +4642,7 @@
             <a:pPr algn="ctr"/>
             <a:r>
               <a:rPr lang="en-US" sz="1400" dirty="0"/>
-              <a:t>3</a:t>
+              <a:t>2</a:t>
             </a:r>
           </a:p>
           <a:p>
@@ -4685,7 +4685,7 @@
             <a:pPr algn="ctr"/>
             <a:r>
               <a:rPr lang="en-US" sz="1400" dirty="0"/>
-              <a:t>2</a:t>
+              <a:t>0</a:t>
             </a:r>
           </a:p>
           <a:p>
@@ -4771,7 +4771,7 @@
             <a:pPr algn="ctr"/>
             <a:r>
               <a:rPr lang="en-US" sz="1400" dirty="0"/>
-              <a:t>9</a:t>
+              <a:t>2</a:t>
             </a:r>
           </a:p>
           <a:p>
@@ -5282,7 +5282,7 @@
             <a:p>
               <a:r>
                 <a:rPr lang="en-US" sz="1400" dirty="0"/>
-                <a:t>12</a:t>
+                <a:t>10</a:t>
               </a:r>
             </a:p>
             <a:p>
@@ -6359,7 +6359,7 @@
             <a:pPr algn="r"/>
             <a:r>
               <a:rPr lang="en-US" sz="1400" dirty="0"/>
-              <a:t>0</a:t>
+              <a:t>1</a:t>
             </a:r>
           </a:p>
           <a:p>
@@ -6402,7 +6402,7 @@
             <a:pPr algn="r"/>
             <a:r>
               <a:rPr lang="en-US" sz="1400" dirty="0"/>
-              <a:t>0</a:t>
+              <a:t>2</a:t>
             </a:r>
           </a:p>
           <a:p>
@@ -6445,7 +6445,7 @@
             <a:pPr algn="r"/>
             <a:r>
               <a:rPr lang="en-US" sz="1400" dirty="0"/>
-              <a:t>1</a:t>
+              <a:t>3</a:t>
             </a:r>
           </a:p>
           <a:p>
@@ -6488,7 +6488,7 @@
             <a:pPr algn="r"/>
             <a:r>
               <a:rPr lang="en-US" sz="1400" dirty="0"/>
-              <a:t>0</a:t>
+              <a:t>7</a:t>
             </a:r>
           </a:p>
           <a:p>
@@ -7140,9 +7140,7 @@
             <a:avLst/>
           </a:prstGeom>
           <a:solidFill>
-            <a:schemeClr val="bg1">
-              <a:lumMod val="85000"/>
-            </a:schemeClr>
+            <a:schemeClr val="bg1"/>
           </a:solidFill>
           <a:ln>
             <a:solidFill>
@@ -7310,7 +7308,7 @@
             <a:pPr algn="ctr"/>
             <a:r>
               <a:rPr lang="en-US" sz="1400" dirty="0"/>
-              <a:t>1</a:t>
+              <a:t>0</a:t>
             </a:r>
           </a:p>
           <a:p>
@@ -7523,7 +7521,7 @@
             <a:pPr algn="r"/>
             <a:r>
               <a:rPr lang="en-US" sz="1400" dirty="0"/>
-              <a:t>1</a:t>
+              <a:t>2</a:t>
             </a:r>
           </a:p>
           <a:p>

</xml_diff>